<commit_message>
Final Description File has been added
Description.pptx
</commit_message>
<xml_diff>
--- a/Description.pptx
+++ b/Description.pptx
@@ -247,6 +247,7 @@
           <a:p>
             <a:fld id="{3FFC243D-5148-4A8B-BBDB-222C461E620F}" type="datetimeFigureOut">
               <a:rPr lang="en-IN" smtClean="0"/>
+              <a:pPr/>
               <a:t>21-03-2018</a:t>
             </a:fld>
             <a:endParaRPr lang="en-IN"/>
@@ -289,6 +290,7 @@
           <a:p>
             <a:fld id="{7D566141-79CB-492E-9646-1517EC284D21}" type="slidenum">
               <a:rPr lang="en-IN" smtClean="0"/>
+              <a:pPr/>
               <a:t>‹#›</a:t>
             </a:fld>
             <a:endParaRPr lang="en-IN"/>
@@ -298,7 +300,7 @@
     </p:spTree>
     <p:extLst>
       <p:ext uri="{BB962C8B-B14F-4D97-AF65-F5344CB8AC3E}">
-        <p14:creationId xmlns:p14="http://schemas.microsoft.com/office/powerpoint/2010/main" val="313248718"/>
+        <p14:creationId xmlns:p14="http://schemas.microsoft.com/office/powerpoint/2010/main" xmlns="" val="313248718"/>
       </p:ext>
     </p:extLst>
   </p:cSld>
@@ -534,6 +536,7 @@
           <a:p>
             <a:fld id="{3FFC243D-5148-4A8B-BBDB-222C461E620F}" type="datetimeFigureOut">
               <a:rPr lang="en-IN" smtClean="0"/>
+              <a:pPr/>
               <a:t>21-03-2018</a:t>
             </a:fld>
             <a:endParaRPr lang="en-IN"/>
@@ -576,6 +579,7 @@
           <a:p>
             <a:fld id="{7D566141-79CB-492E-9646-1517EC284D21}" type="slidenum">
               <a:rPr lang="en-IN" smtClean="0"/>
+              <a:pPr/>
               <a:t>‹#›</a:t>
             </a:fld>
             <a:endParaRPr lang="en-IN"/>
@@ -585,7 +589,7 @@
     </p:spTree>
     <p:extLst>
       <p:ext uri="{BB962C8B-B14F-4D97-AF65-F5344CB8AC3E}">
-        <p14:creationId xmlns:p14="http://schemas.microsoft.com/office/powerpoint/2010/main" val="176794209"/>
+        <p14:creationId xmlns:p14="http://schemas.microsoft.com/office/powerpoint/2010/main" xmlns="" val="176794209"/>
       </p:ext>
     </p:extLst>
   </p:cSld>
@@ -726,6 +730,7 @@
           <a:p>
             <a:fld id="{3FFC243D-5148-4A8B-BBDB-222C461E620F}" type="datetimeFigureOut">
               <a:rPr lang="en-IN" smtClean="0"/>
+              <a:pPr/>
               <a:t>21-03-2018</a:t>
             </a:fld>
             <a:endParaRPr lang="en-IN"/>
@@ -768,6 +773,7 @@
           <a:p>
             <a:fld id="{7D566141-79CB-492E-9646-1517EC284D21}" type="slidenum">
               <a:rPr lang="en-IN" smtClean="0"/>
+              <a:pPr/>
               <a:t>‹#›</a:t>
             </a:fld>
             <a:endParaRPr lang="en-IN"/>
@@ -777,7 +783,7 @@
     </p:spTree>
     <p:extLst>
       <p:ext uri="{BB962C8B-B14F-4D97-AF65-F5344CB8AC3E}">
-        <p14:creationId xmlns:p14="http://schemas.microsoft.com/office/powerpoint/2010/main" val="2670091378"/>
+        <p14:creationId xmlns:p14="http://schemas.microsoft.com/office/powerpoint/2010/main" xmlns="" val="2670091378"/>
       </p:ext>
     </p:extLst>
   </p:cSld>
@@ -987,6 +993,7 @@
           <a:p>
             <a:fld id="{3FFC243D-5148-4A8B-BBDB-222C461E620F}" type="datetimeFigureOut">
               <a:rPr lang="en-IN" smtClean="0"/>
+              <a:pPr/>
               <a:t>21-03-2018</a:t>
             </a:fld>
             <a:endParaRPr lang="en-IN"/>
@@ -1029,6 +1036,7 @@
           <a:p>
             <a:fld id="{7D566141-79CB-492E-9646-1517EC284D21}" type="slidenum">
               <a:rPr lang="en-IN" smtClean="0"/>
+              <a:pPr/>
               <a:t>‹#›</a:t>
             </a:fld>
             <a:endParaRPr lang="en-IN"/>
@@ -1270,7 +1278,7 @@
     </p:spTree>
     <p:extLst>
       <p:ext uri="{BB962C8B-B14F-4D97-AF65-F5344CB8AC3E}">
-        <p14:creationId xmlns:p14="http://schemas.microsoft.com/office/powerpoint/2010/main" val="2412023547"/>
+        <p14:creationId xmlns:p14="http://schemas.microsoft.com/office/powerpoint/2010/main" xmlns="" val="2412023547"/>
       </p:ext>
     </p:extLst>
   </p:cSld>
@@ -1411,6 +1419,7 @@
           <a:p>
             <a:fld id="{3FFC243D-5148-4A8B-BBDB-222C461E620F}" type="datetimeFigureOut">
               <a:rPr lang="en-IN" smtClean="0"/>
+              <a:pPr/>
               <a:t>21-03-2018</a:t>
             </a:fld>
             <a:endParaRPr lang="en-IN"/>
@@ -1453,6 +1462,7 @@
           <a:p>
             <a:fld id="{7D566141-79CB-492E-9646-1517EC284D21}" type="slidenum">
               <a:rPr lang="en-IN" smtClean="0"/>
+              <a:pPr/>
               <a:t>‹#›</a:t>
             </a:fld>
             <a:endParaRPr lang="en-IN"/>
@@ -1462,7 +1472,7 @@
     </p:spTree>
     <p:extLst>
       <p:ext uri="{BB962C8B-B14F-4D97-AF65-F5344CB8AC3E}">
-        <p14:creationId xmlns:p14="http://schemas.microsoft.com/office/powerpoint/2010/main" val="1763929728"/>
+        <p14:creationId xmlns:p14="http://schemas.microsoft.com/office/powerpoint/2010/main" xmlns="" val="1763929728"/>
       </p:ext>
     </p:extLst>
   </p:cSld>
@@ -1957,6 +1967,7 @@
           <a:p>
             <a:fld id="{3FFC243D-5148-4A8B-BBDB-222C461E620F}" type="datetimeFigureOut">
               <a:rPr lang="en-IN" smtClean="0"/>
+              <a:pPr/>
               <a:t>21-03-2018</a:t>
             </a:fld>
             <a:endParaRPr lang="en-IN"/>
@@ -1999,6 +2010,7 @@
           <a:p>
             <a:fld id="{7D566141-79CB-492E-9646-1517EC284D21}" type="slidenum">
               <a:rPr lang="en-IN" smtClean="0"/>
+              <a:pPr/>
               <a:t>‹#›</a:t>
             </a:fld>
             <a:endParaRPr lang="en-IN"/>
@@ -2008,7 +2020,7 @@
     </p:spTree>
     <p:extLst>
       <p:ext uri="{BB962C8B-B14F-4D97-AF65-F5344CB8AC3E}">
-        <p14:creationId xmlns:p14="http://schemas.microsoft.com/office/powerpoint/2010/main" val="991208107"/>
+        <p14:creationId xmlns:p14="http://schemas.microsoft.com/office/powerpoint/2010/main" xmlns="" val="991208107"/>
       </p:ext>
     </p:extLst>
   </p:cSld>
@@ -2797,6 +2809,7 @@
           <a:p>
             <a:fld id="{3FFC243D-5148-4A8B-BBDB-222C461E620F}" type="datetimeFigureOut">
               <a:rPr lang="en-IN" smtClean="0"/>
+              <a:pPr/>
               <a:t>21-03-2018</a:t>
             </a:fld>
             <a:endParaRPr lang="en-IN"/>
@@ -2839,6 +2852,7 @@
           <a:p>
             <a:fld id="{7D566141-79CB-492E-9646-1517EC284D21}" type="slidenum">
               <a:rPr lang="en-IN" smtClean="0"/>
+              <a:pPr/>
               <a:t>‹#›</a:t>
             </a:fld>
             <a:endParaRPr lang="en-IN"/>
@@ -2848,7 +2862,7 @@
     </p:spTree>
     <p:extLst>
       <p:ext uri="{BB962C8B-B14F-4D97-AF65-F5344CB8AC3E}">
-        <p14:creationId xmlns:p14="http://schemas.microsoft.com/office/powerpoint/2010/main" val="456909270"/>
+        <p14:creationId xmlns:p14="http://schemas.microsoft.com/office/powerpoint/2010/main" xmlns="" val="456909270"/>
       </p:ext>
     </p:extLst>
   </p:cSld>
@@ -2967,6 +2981,7 @@
           <a:p>
             <a:fld id="{3FFC243D-5148-4A8B-BBDB-222C461E620F}" type="datetimeFigureOut">
               <a:rPr lang="en-IN" smtClean="0"/>
+              <a:pPr/>
               <a:t>21-03-2018</a:t>
             </a:fld>
             <a:endParaRPr lang="en-IN"/>
@@ -3009,6 +3024,7 @@
           <a:p>
             <a:fld id="{7D566141-79CB-492E-9646-1517EC284D21}" type="slidenum">
               <a:rPr lang="en-IN" smtClean="0"/>
+              <a:pPr/>
               <a:t>‹#›</a:t>
             </a:fld>
             <a:endParaRPr lang="en-IN"/>
@@ -3018,7 +3034,7 @@
     </p:spTree>
     <p:extLst>
       <p:ext uri="{BB962C8B-B14F-4D97-AF65-F5344CB8AC3E}">
-        <p14:creationId xmlns:p14="http://schemas.microsoft.com/office/powerpoint/2010/main" val="2718294070"/>
+        <p14:creationId xmlns:p14="http://schemas.microsoft.com/office/powerpoint/2010/main" xmlns="" val="2718294070"/>
       </p:ext>
     </p:extLst>
   </p:cSld>
@@ -3151,6 +3167,7 @@
           <a:p>
             <a:fld id="{3FFC243D-5148-4A8B-BBDB-222C461E620F}" type="datetimeFigureOut">
               <a:rPr lang="en-IN" smtClean="0"/>
+              <a:pPr/>
               <a:t>21-03-2018</a:t>
             </a:fld>
             <a:endParaRPr lang="en-IN"/>
@@ -3193,6 +3210,7 @@
           <a:p>
             <a:fld id="{7D566141-79CB-492E-9646-1517EC284D21}" type="slidenum">
               <a:rPr lang="en-IN" smtClean="0"/>
+              <a:pPr/>
               <a:t>‹#›</a:t>
             </a:fld>
             <a:endParaRPr lang="en-IN"/>
@@ -3202,7 +3220,7 @@
     </p:spTree>
     <p:extLst>
       <p:ext uri="{BB962C8B-B14F-4D97-AF65-F5344CB8AC3E}">
-        <p14:creationId xmlns:p14="http://schemas.microsoft.com/office/powerpoint/2010/main" val="1769033787"/>
+        <p14:creationId xmlns:p14="http://schemas.microsoft.com/office/powerpoint/2010/main" xmlns="" val="1769033787"/>
       </p:ext>
     </p:extLst>
   </p:cSld>
@@ -3321,6 +3339,7 @@
           <a:p>
             <a:fld id="{3FFC243D-5148-4A8B-BBDB-222C461E620F}" type="datetimeFigureOut">
               <a:rPr lang="en-IN" smtClean="0"/>
+              <a:pPr/>
               <a:t>21-03-2018</a:t>
             </a:fld>
             <a:endParaRPr lang="en-IN"/>
@@ -3363,6 +3382,7 @@
           <a:p>
             <a:fld id="{7D566141-79CB-492E-9646-1517EC284D21}" type="slidenum">
               <a:rPr lang="en-IN" smtClean="0"/>
+              <a:pPr/>
               <a:t>‹#›</a:t>
             </a:fld>
             <a:endParaRPr lang="en-IN"/>
@@ -3372,7 +3392,7 @@
     </p:spTree>
     <p:extLst>
       <p:ext uri="{BB962C8B-B14F-4D97-AF65-F5344CB8AC3E}">
-        <p14:creationId xmlns:p14="http://schemas.microsoft.com/office/powerpoint/2010/main" val="3036000742"/>
+        <p14:creationId xmlns:p14="http://schemas.microsoft.com/office/powerpoint/2010/main" xmlns="" val="3036000742"/>
       </p:ext>
     </p:extLst>
   </p:cSld>
@@ -3569,6 +3589,7 @@
           <a:p>
             <a:fld id="{3FFC243D-5148-4A8B-BBDB-222C461E620F}" type="datetimeFigureOut">
               <a:rPr lang="en-IN" smtClean="0"/>
+              <a:pPr/>
               <a:t>21-03-2018</a:t>
             </a:fld>
             <a:endParaRPr lang="en-IN"/>
@@ -3611,6 +3632,7 @@
           <a:p>
             <a:fld id="{7D566141-79CB-492E-9646-1517EC284D21}" type="slidenum">
               <a:rPr lang="en-IN" smtClean="0"/>
+              <a:pPr/>
               <a:t>‹#›</a:t>
             </a:fld>
             <a:endParaRPr lang="en-IN"/>
@@ -3620,7 +3642,7 @@
     </p:spTree>
     <p:extLst>
       <p:ext uri="{BB962C8B-B14F-4D97-AF65-F5344CB8AC3E}">
-        <p14:creationId xmlns:p14="http://schemas.microsoft.com/office/powerpoint/2010/main" val="469672656"/>
+        <p14:creationId xmlns:p14="http://schemas.microsoft.com/office/powerpoint/2010/main" xmlns="" val="469672656"/>
       </p:ext>
     </p:extLst>
   </p:cSld>
@@ -3806,6 +3828,7 @@
           <a:p>
             <a:fld id="{3FFC243D-5148-4A8B-BBDB-222C461E620F}" type="datetimeFigureOut">
               <a:rPr lang="en-IN" smtClean="0"/>
+              <a:pPr/>
               <a:t>21-03-2018</a:t>
             </a:fld>
             <a:endParaRPr lang="en-IN"/>
@@ -3848,6 +3871,7 @@
           <a:p>
             <a:fld id="{7D566141-79CB-492E-9646-1517EC284D21}" type="slidenum">
               <a:rPr lang="en-IN" smtClean="0"/>
+              <a:pPr/>
               <a:t>‹#›</a:t>
             </a:fld>
             <a:endParaRPr lang="en-IN"/>
@@ -3857,7 +3881,7 @@
     </p:spTree>
     <p:extLst>
       <p:ext uri="{BB962C8B-B14F-4D97-AF65-F5344CB8AC3E}">
-        <p14:creationId xmlns:p14="http://schemas.microsoft.com/office/powerpoint/2010/main" val="3904472792"/>
+        <p14:creationId xmlns:p14="http://schemas.microsoft.com/office/powerpoint/2010/main" xmlns="" val="3904472792"/>
       </p:ext>
     </p:extLst>
   </p:cSld>
@@ -4179,6 +4203,7 @@
           <a:p>
             <a:fld id="{3FFC243D-5148-4A8B-BBDB-222C461E620F}" type="datetimeFigureOut">
               <a:rPr lang="en-IN" smtClean="0"/>
+              <a:pPr/>
               <a:t>21-03-2018</a:t>
             </a:fld>
             <a:endParaRPr lang="en-IN"/>
@@ -4221,6 +4246,7 @@
           <a:p>
             <a:fld id="{7D566141-79CB-492E-9646-1517EC284D21}" type="slidenum">
               <a:rPr lang="en-IN" smtClean="0"/>
+              <a:pPr/>
               <a:t>‹#›</a:t>
             </a:fld>
             <a:endParaRPr lang="en-IN"/>
@@ -4230,7 +4256,7 @@
     </p:spTree>
     <p:extLst>
       <p:ext uri="{BB962C8B-B14F-4D97-AF65-F5344CB8AC3E}">
-        <p14:creationId xmlns:p14="http://schemas.microsoft.com/office/powerpoint/2010/main" val="2397083865"/>
+        <p14:creationId xmlns:p14="http://schemas.microsoft.com/office/powerpoint/2010/main" xmlns="" val="2397083865"/>
       </p:ext>
     </p:extLst>
   </p:cSld>
@@ -4297,6 +4323,7 @@
           <a:p>
             <a:fld id="{3FFC243D-5148-4A8B-BBDB-222C461E620F}" type="datetimeFigureOut">
               <a:rPr lang="en-IN" smtClean="0"/>
+              <a:pPr/>
               <a:t>21-03-2018</a:t>
             </a:fld>
             <a:endParaRPr lang="en-IN"/>
@@ -4339,6 +4366,7 @@
           <a:p>
             <a:fld id="{7D566141-79CB-492E-9646-1517EC284D21}" type="slidenum">
               <a:rPr lang="en-IN" smtClean="0"/>
+              <a:pPr/>
               <a:t>‹#›</a:t>
             </a:fld>
             <a:endParaRPr lang="en-IN"/>
@@ -4348,7 +4376,7 @@
     </p:spTree>
     <p:extLst>
       <p:ext uri="{BB962C8B-B14F-4D97-AF65-F5344CB8AC3E}">
-        <p14:creationId xmlns:p14="http://schemas.microsoft.com/office/powerpoint/2010/main" val="3416020937"/>
+        <p14:creationId xmlns:p14="http://schemas.microsoft.com/office/powerpoint/2010/main" xmlns="" val="3416020937"/>
       </p:ext>
     </p:extLst>
   </p:cSld>
@@ -4392,6 +4420,7 @@
           <a:p>
             <a:fld id="{3FFC243D-5148-4A8B-BBDB-222C461E620F}" type="datetimeFigureOut">
               <a:rPr lang="en-IN" smtClean="0"/>
+              <a:pPr/>
               <a:t>21-03-2018</a:t>
             </a:fld>
             <a:endParaRPr lang="en-IN"/>
@@ -4434,6 +4463,7 @@
           <a:p>
             <a:fld id="{7D566141-79CB-492E-9646-1517EC284D21}" type="slidenum">
               <a:rPr lang="en-IN" smtClean="0"/>
+              <a:pPr/>
               <a:t>‹#›</a:t>
             </a:fld>
             <a:endParaRPr lang="en-IN"/>
@@ -4443,7 +4473,7 @@
     </p:spTree>
     <p:extLst>
       <p:ext uri="{BB962C8B-B14F-4D97-AF65-F5344CB8AC3E}">
-        <p14:creationId xmlns:p14="http://schemas.microsoft.com/office/powerpoint/2010/main" val="165705958"/>
+        <p14:creationId xmlns:p14="http://schemas.microsoft.com/office/powerpoint/2010/main" xmlns="" val="165705958"/>
       </p:ext>
     </p:extLst>
   </p:cSld>
@@ -4643,6 +4673,7 @@
           <a:p>
             <a:fld id="{3FFC243D-5148-4A8B-BBDB-222C461E620F}" type="datetimeFigureOut">
               <a:rPr lang="en-IN" smtClean="0"/>
+              <a:pPr/>
               <a:t>21-03-2018</a:t>
             </a:fld>
             <a:endParaRPr lang="en-IN"/>
@@ -4685,6 +4716,7 @@
           <a:p>
             <a:fld id="{7D566141-79CB-492E-9646-1517EC284D21}" type="slidenum">
               <a:rPr lang="en-IN" smtClean="0"/>
+              <a:pPr/>
               <a:t>‹#›</a:t>
             </a:fld>
             <a:endParaRPr lang="en-IN"/>
@@ -4694,7 +4726,7 @@
     </p:spTree>
     <p:extLst>
       <p:ext uri="{BB962C8B-B14F-4D97-AF65-F5344CB8AC3E}">
-        <p14:creationId xmlns:p14="http://schemas.microsoft.com/office/powerpoint/2010/main" val="1120318067"/>
+        <p14:creationId xmlns:p14="http://schemas.microsoft.com/office/powerpoint/2010/main" xmlns="" val="1120318067"/>
       </p:ext>
     </p:extLst>
   </p:cSld>
@@ -4930,6 +4962,7 @@
           <a:p>
             <a:fld id="{3FFC243D-5148-4A8B-BBDB-222C461E620F}" type="datetimeFigureOut">
               <a:rPr lang="en-IN" smtClean="0"/>
+              <a:pPr/>
               <a:t>21-03-2018</a:t>
             </a:fld>
             <a:endParaRPr lang="en-IN"/>
@@ -4972,6 +5005,7 @@
           <a:p>
             <a:fld id="{7D566141-79CB-492E-9646-1517EC284D21}" type="slidenum">
               <a:rPr lang="en-IN" smtClean="0"/>
+              <a:pPr/>
               <a:t>‹#›</a:t>
             </a:fld>
             <a:endParaRPr lang="en-IN"/>
@@ -4981,7 +5015,7 @@
     </p:spTree>
     <p:extLst>
       <p:ext uri="{BB962C8B-B14F-4D97-AF65-F5344CB8AC3E}">
-        <p14:creationId xmlns:p14="http://schemas.microsoft.com/office/powerpoint/2010/main" val="2344410637"/>
+        <p14:creationId xmlns:p14="http://schemas.microsoft.com/office/powerpoint/2010/main" xmlns="" val="2344410637"/>
       </p:ext>
     </p:extLst>
   </p:cSld>
@@ -5143,6 +5177,7 @@
           <a:p>
             <a:fld id="{3FFC243D-5148-4A8B-BBDB-222C461E620F}" type="datetimeFigureOut">
               <a:rPr lang="en-IN" smtClean="0"/>
+              <a:pPr/>
               <a:t>21-03-2018</a:t>
             </a:fld>
             <a:endParaRPr lang="en-IN"/>
@@ -5221,6 +5256,7 @@
           <a:p>
             <a:fld id="{7D566141-79CB-492E-9646-1517EC284D21}" type="slidenum">
               <a:rPr lang="en-IN" smtClean="0"/>
+              <a:pPr/>
               <a:t>‹#›</a:t>
             </a:fld>
             <a:endParaRPr lang="en-IN"/>
@@ -5230,7 +5266,7 @@
     </p:spTree>
     <p:extLst>
       <p:ext uri="{BB962C8B-B14F-4D97-AF65-F5344CB8AC3E}">
-        <p14:creationId xmlns:p14="http://schemas.microsoft.com/office/powerpoint/2010/main" val="3365422538"/>
+        <p14:creationId xmlns:p14="http://schemas.microsoft.com/office/powerpoint/2010/main" xmlns="" val="3365422538"/>
       </p:ext>
     </p:extLst>
   </p:cSld>
@@ -5629,7 +5665,7 @@
           <p:cNvPr id="2" name="Title 1">
             <a:extLst>
               <a:ext uri="{FF2B5EF4-FFF2-40B4-BE49-F238E27FC236}">
-                <a16:creationId xmlns:a16="http://schemas.microsoft.com/office/drawing/2014/main" id="{D0C288FD-8808-4C24-8613-CBAAB48D9DCE}"/>
+                <a16:creationId xmlns:a16="http://schemas.microsoft.com/office/drawing/2014/main" xmlns="" id="{D0C288FD-8808-4C24-8613-CBAAB48D9DCE}"/>
               </a:ext>
             </a:extLst>
           </p:cNvPr>
@@ -5657,7 +5693,7 @@
           <p:cNvPr id="3" name="Subtitle 2">
             <a:extLst>
               <a:ext uri="{FF2B5EF4-FFF2-40B4-BE49-F238E27FC236}">
-                <a16:creationId xmlns:a16="http://schemas.microsoft.com/office/drawing/2014/main" id="{C4269DB9-CAD4-42B6-9916-800A35D1B51D}"/>
+                <a16:creationId xmlns:a16="http://schemas.microsoft.com/office/drawing/2014/main" xmlns="" id="{C4269DB9-CAD4-42B6-9916-800A35D1B51D}"/>
               </a:ext>
             </a:extLst>
           </p:cNvPr>
@@ -5688,7 +5724,7 @@
     </p:spTree>
     <p:extLst>
       <p:ext uri="{BB962C8B-B14F-4D97-AF65-F5344CB8AC3E}">
-        <p14:creationId xmlns:p14="http://schemas.microsoft.com/office/powerpoint/2010/main" val="1427033866"/>
+        <p14:creationId xmlns:p14="http://schemas.microsoft.com/office/powerpoint/2010/main" xmlns="" val="1427033866"/>
       </p:ext>
     </p:extLst>
   </p:cSld>
@@ -5720,7 +5756,7 @@
           <p:cNvPr id="2" name="Title 1">
             <a:extLst>
               <a:ext uri="{FF2B5EF4-FFF2-40B4-BE49-F238E27FC236}">
-                <a16:creationId xmlns:a16="http://schemas.microsoft.com/office/drawing/2014/main" id="{043DE5AC-1D69-4A9A-AFDF-CD05856C6D02}"/>
+                <a16:creationId xmlns:a16="http://schemas.microsoft.com/office/drawing/2014/main" xmlns="" id="{043DE5AC-1D69-4A9A-AFDF-CD05856C6D02}"/>
               </a:ext>
             </a:extLst>
           </p:cNvPr>
@@ -5753,7 +5789,7 @@
           <p:cNvPr id="3" name="Content Placeholder 2">
             <a:extLst>
               <a:ext uri="{FF2B5EF4-FFF2-40B4-BE49-F238E27FC236}">
-                <a16:creationId xmlns:a16="http://schemas.microsoft.com/office/drawing/2014/main" id="{4A832F65-D591-42C3-90EC-6D57F4397612}"/>
+                <a16:creationId xmlns:a16="http://schemas.microsoft.com/office/drawing/2014/main" xmlns="" id="{4A832F65-D591-42C3-90EC-6D57F4397612}"/>
               </a:ext>
             </a:extLst>
           </p:cNvPr>
@@ -5834,7 +5870,7 @@
     </p:spTree>
     <p:extLst>
       <p:ext uri="{BB962C8B-B14F-4D97-AF65-F5344CB8AC3E}">
-        <p14:creationId xmlns:p14="http://schemas.microsoft.com/office/powerpoint/2010/main" val="150235125"/>
+        <p14:creationId xmlns:p14="http://schemas.microsoft.com/office/powerpoint/2010/main" xmlns="" val="150235125"/>
       </p:ext>
     </p:extLst>
   </p:cSld>
@@ -5866,7 +5902,7 @@
           <p:cNvPr id="2" name="Title 1">
             <a:extLst>
               <a:ext uri="{FF2B5EF4-FFF2-40B4-BE49-F238E27FC236}">
-                <a16:creationId xmlns:a16="http://schemas.microsoft.com/office/drawing/2014/main" id="{2A5E698F-F657-430A-8832-ADA083E4BCF9}"/>
+                <a16:creationId xmlns:a16="http://schemas.microsoft.com/office/drawing/2014/main" xmlns="" id="{2A5E698F-F657-430A-8832-ADA083E4BCF9}"/>
               </a:ext>
             </a:extLst>
           </p:cNvPr>
@@ -5899,7 +5935,7 @@
           <p:cNvPr id="4" name="Content Placeholder 3">
             <a:extLst>
               <a:ext uri="{FF2B5EF4-FFF2-40B4-BE49-F238E27FC236}">
-                <a16:creationId xmlns:a16="http://schemas.microsoft.com/office/drawing/2014/main" id="{C3B64D5E-3764-40B3-A626-C448BCB7F6F4}"/>
+                <a16:creationId xmlns:a16="http://schemas.microsoft.com/office/drawing/2014/main" xmlns="" id="{C3B64D5E-3764-40B3-A626-C448BCB7F6F4}"/>
               </a:ext>
             </a:extLst>
           </p:cNvPr>
@@ -5929,7 +5965,7 @@
     </p:spTree>
     <p:extLst>
       <p:ext uri="{BB962C8B-B14F-4D97-AF65-F5344CB8AC3E}">
-        <p14:creationId xmlns:p14="http://schemas.microsoft.com/office/powerpoint/2010/main" val="1486816559"/>
+        <p14:creationId xmlns:p14="http://schemas.microsoft.com/office/powerpoint/2010/main" xmlns="" val="1486816559"/>
       </p:ext>
     </p:extLst>
   </p:cSld>
@@ -5961,7 +5997,7 @@
           <p:cNvPr id="8" name="Picture 7">
             <a:extLst>
               <a:ext uri="{FF2B5EF4-FFF2-40B4-BE49-F238E27FC236}">
-                <a16:creationId xmlns:a16="http://schemas.microsoft.com/office/drawing/2014/main" id="{3D033AFE-C223-4117-8C9D-FBE8EBC90768}"/>
+                <a16:creationId xmlns:a16="http://schemas.microsoft.com/office/drawing/2014/main" xmlns="" id="{3D033AFE-C223-4117-8C9D-FBE8EBC90768}"/>
               </a:ext>
             </a:extLst>
           </p:cNvPr>
@@ -5991,7 +6027,7 @@
           <p:cNvPr id="9" name="Picture 8">
             <a:extLst>
               <a:ext uri="{FF2B5EF4-FFF2-40B4-BE49-F238E27FC236}">
-                <a16:creationId xmlns:a16="http://schemas.microsoft.com/office/drawing/2014/main" id="{C6BAE8BE-3ED9-4E2B-B360-882916AE4AC3}"/>
+                <a16:creationId xmlns:a16="http://schemas.microsoft.com/office/drawing/2014/main" xmlns="" id="{C6BAE8BE-3ED9-4E2B-B360-882916AE4AC3}"/>
               </a:ext>
             </a:extLst>
           </p:cNvPr>
@@ -6019,7 +6055,7 @@
     </p:spTree>
     <p:extLst>
       <p:ext uri="{BB962C8B-B14F-4D97-AF65-F5344CB8AC3E}">
-        <p14:creationId xmlns:p14="http://schemas.microsoft.com/office/powerpoint/2010/main" val="489902207"/>
+        <p14:creationId xmlns:p14="http://schemas.microsoft.com/office/powerpoint/2010/main" xmlns="" val="489902207"/>
       </p:ext>
     </p:extLst>
   </p:cSld>
@@ -6051,7 +6087,7 @@
           <p:cNvPr id="2" name="Title 1">
             <a:extLst>
               <a:ext uri="{FF2B5EF4-FFF2-40B4-BE49-F238E27FC236}">
-                <a16:creationId xmlns:a16="http://schemas.microsoft.com/office/drawing/2014/main" id="{6AF56437-87E7-4821-8CA5-14FBBC7A3907}"/>
+                <a16:creationId xmlns:a16="http://schemas.microsoft.com/office/drawing/2014/main" xmlns="" id="{6AF56437-87E7-4821-8CA5-14FBBC7A3907}"/>
               </a:ext>
             </a:extLst>
           </p:cNvPr>
@@ -6079,7 +6115,7 @@
           <p:cNvPr id="4" name="Content Placeholder 3">
             <a:extLst>
               <a:ext uri="{FF2B5EF4-FFF2-40B4-BE49-F238E27FC236}">
-                <a16:creationId xmlns:a16="http://schemas.microsoft.com/office/drawing/2014/main" id="{43F33173-EC38-4BB8-A4A5-E69E43C202E6}"/>
+                <a16:creationId xmlns:a16="http://schemas.microsoft.com/office/drawing/2014/main" xmlns="" id="{43F33173-EC38-4BB8-A4A5-E69E43C202E6}"/>
               </a:ext>
             </a:extLst>
           </p:cNvPr>
@@ -6111,7 +6147,7 @@
           <p:cNvPr id="5" name="Picture 4">
             <a:extLst>
               <a:ext uri="{FF2B5EF4-FFF2-40B4-BE49-F238E27FC236}">
-                <a16:creationId xmlns:a16="http://schemas.microsoft.com/office/drawing/2014/main" id="{DD335B1A-76DB-417D-93F4-E0F45D57BD0E}"/>
+                <a16:creationId xmlns:a16="http://schemas.microsoft.com/office/drawing/2014/main" xmlns="" id="{DD335B1A-76DB-417D-93F4-E0F45D57BD0E}"/>
               </a:ext>
             </a:extLst>
           </p:cNvPr>
@@ -6139,7 +6175,7 @@
     </p:spTree>
     <p:extLst>
       <p:ext uri="{BB962C8B-B14F-4D97-AF65-F5344CB8AC3E}">
-        <p14:creationId xmlns:p14="http://schemas.microsoft.com/office/powerpoint/2010/main" val="2791680908"/>
+        <p14:creationId xmlns:p14="http://schemas.microsoft.com/office/powerpoint/2010/main" xmlns="" val="2791680908"/>
       </p:ext>
     </p:extLst>
   </p:cSld>
@@ -6171,7 +6207,7 @@
           <p:cNvPr id="2" name="Title 1">
             <a:extLst>
               <a:ext uri="{FF2B5EF4-FFF2-40B4-BE49-F238E27FC236}">
-                <a16:creationId xmlns:a16="http://schemas.microsoft.com/office/drawing/2014/main" id="{99AE0B59-317C-427A-8BBD-47CA05EFEDCC}"/>
+                <a16:creationId xmlns:a16="http://schemas.microsoft.com/office/drawing/2014/main" xmlns="" id="{99AE0B59-317C-427A-8BBD-47CA05EFEDCC}"/>
               </a:ext>
             </a:extLst>
           </p:cNvPr>
@@ -6199,7 +6235,7 @@
           <p:cNvPr id="4" name="Content Placeholder 3">
             <a:extLst>
               <a:ext uri="{FF2B5EF4-FFF2-40B4-BE49-F238E27FC236}">
-                <a16:creationId xmlns:a16="http://schemas.microsoft.com/office/drawing/2014/main" id="{E3DF0DA0-F9D4-4FE0-BE79-604744CBD9A4}"/>
+                <a16:creationId xmlns:a16="http://schemas.microsoft.com/office/drawing/2014/main" xmlns="" id="{E3DF0DA0-F9D4-4FE0-BE79-604744CBD9A4}"/>
               </a:ext>
             </a:extLst>
           </p:cNvPr>
@@ -6231,7 +6267,7 @@
           <p:cNvPr id="5" name="Picture 4">
             <a:extLst>
               <a:ext uri="{FF2B5EF4-FFF2-40B4-BE49-F238E27FC236}">
-                <a16:creationId xmlns:a16="http://schemas.microsoft.com/office/drawing/2014/main" id="{C9C1E511-CD78-42B6-9031-B967EFBD4E1D}"/>
+                <a16:creationId xmlns:a16="http://schemas.microsoft.com/office/drawing/2014/main" xmlns="" id="{C9C1E511-CD78-42B6-9031-B967EFBD4E1D}"/>
               </a:ext>
             </a:extLst>
           </p:cNvPr>
@@ -6259,7 +6295,7 @@
     </p:spTree>
     <p:extLst>
       <p:ext uri="{BB962C8B-B14F-4D97-AF65-F5344CB8AC3E}">
-        <p14:creationId xmlns:p14="http://schemas.microsoft.com/office/powerpoint/2010/main" val="1301972226"/>
+        <p14:creationId xmlns:p14="http://schemas.microsoft.com/office/powerpoint/2010/main" xmlns="" val="1301972226"/>
       </p:ext>
     </p:extLst>
   </p:cSld>
@@ -6288,10 +6324,10 @@
       </p:grpSpPr>
       <p:sp>
         <p:nvSpPr>
-          <p:cNvPr id="2" name="Title 1">
+          <p:cNvPr id="3" name="Content Placeholder 2">
             <a:extLst>
               <a:ext uri="{FF2B5EF4-FFF2-40B4-BE49-F238E27FC236}">
-                <a16:creationId xmlns:a16="http://schemas.microsoft.com/office/drawing/2014/main" id="{5AF965B1-4431-45C4-8803-05577A892925}"/>
+                <a16:creationId xmlns:a16="http://schemas.microsoft.com/office/drawing/2014/main" xmlns="" id="{0A49D06B-FF34-4F72-8C52-760F094DC5C0}"/>
               </a:ext>
             </a:extLst>
           </p:cNvPr>
@@ -6299,47 +6335,31 @@
             <a:spLocks noGrp="1"/>
           </p:cNvSpPr>
           <p:nvPr>
-            <p:ph type="title"/>
-          </p:nvPr>
-        </p:nvSpPr>
-        <p:spPr/>
-        <p:txBody>
-          <a:bodyPr/>
-          <a:lstStyle/>
-          <a:p>
-            <a:endParaRPr lang="en-IN" dirty="0"/>
-          </a:p>
-        </p:txBody>
-      </p:sp>
-      <p:sp>
-        <p:nvSpPr>
-          <p:cNvPr id="3" name="Content Placeholder 2">
-            <a:extLst>
-              <a:ext uri="{FF2B5EF4-FFF2-40B4-BE49-F238E27FC236}">
-                <a16:creationId xmlns:a16="http://schemas.microsoft.com/office/drawing/2014/main" id="{0A49D06B-FF34-4F72-8C52-760F094DC5C0}"/>
-              </a:ext>
-            </a:extLst>
-          </p:cNvPr>
-          <p:cNvSpPr>
-            <a:spLocks noGrp="1"/>
-          </p:cNvSpPr>
-          <p:nvPr>
             <p:ph idx="1"/>
           </p:nvPr>
         </p:nvSpPr>
-        <p:spPr/>
-        <p:txBody>
-          <a:bodyPr/>
-          <a:lstStyle/>
-          <a:p>
-            <a:endParaRPr lang="en-IN"/>
+        <p:spPr>
+          <a:xfrm>
+            <a:off x="952983" y="2566327"/>
+            <a:ext cx="10353762" cy="3695136"/>
+          </a:xfrm>
+        </p:spPr>
+        <p:txBody>
+          <a:bodyPr/>
+          <a:lstStyle/>
+          <a:p>
+            <a:pPr algn="ctr"/>
+            <a:r>
+              <a:rPr lang="en-IN" dirty="0" smtClean="0"/>
+              <a:t>Open Main.html to start the website</a:t>
+            </a:r>
           </a:p>
         </p:txBody>
       </p:sp>
     </p:spTree>
     <p:extLst>
       <p:ext uri="{BB962C8B-B14F-4D97-AF65-F5344CB8AC3E}">
-        <p14:creationId xmlns:p14="http://schemas.microsoft.com/office/powerpoint/2010/main" val="2247260032"/>
+        <p14:creationId xmlns:p14="http://schemas.microsoft.com/office/powerpoint/2010/main" xmlns="" val="2247260032"/>
       </p:ext>
     </p:extLst>
   </p:cSld>
@@ -6371,7 +6391,7 @@
           <p:cNvPr id="2" name="Title 1">
             <a:extLst>
               <a:ext uri="{FF2B5EF4-FFF2-40B4-BE49-F238E27FC236}">
-                <a16:creationId xmlns:a16="http://schemas.microsoft.com/office/drawing/2014/main" id="{0CF7E6C8-D3B5-4851-8013-C5318E4CD3A3}"/>
+                <a16:creationId xmlns:a16="http://schemas.microsoft.com/office/drawing/2014/main" xmlns="" id="{0CF7E6C8-D3B5-4851-8013-C5318E4CD3A3}"/>
               </a:ext>
             </a:extLst>
           </p:cNvPr>
@@ -6402,7 +6422,7 @@
     </p:spTree>
     <p:extLst>
       <p:ext uri="{BB962C8B-B14F-4D97-AF65-F5344CB8AC3E}">
-        <p14:creationId xmlns:p14="http://schemas.microsoft.com/office/powerpoint/2010/main" val="2382614142"/>
+        <p14:creationId xmlns:p14="http://schemas.microsoft.com/office/powerpoint/2010/main" xmlns="" val="2382614142"/>
       </p:ext>
     </p:extLst>
   </p:cSld>
@@ -6455,7 +6475,7 @@
     </a:clrScheme>
     <a:fontScheme name="Damask">
       <a:majorFont>
-        <a:latin typeface="Bookman Old Style" panose="02050604050505020204"/>
+        <a:latin typeface="Bookman Old Style"/>
         <a:ea typeface=""/>
         <a:cs typeface=""/>
         <a:font script="Jpan" typeface="ＭＳ Ｐゴシック"/>
@@ -6490,7 +6510,7 @@
         <a:font script="Geor" typeface="Sylfaen"/>
       </a:majorFont>
       <a:minorFont>
-        <a:latin typeface="Rockwell" panose="02060603020205020403"/>
+        <a:latin typeface="Rockwell"/>
         <a:ea typeface=""/>
         <a:cs typeface=""/>
         <a:font script="Jpan" typeface="ＭＳ Ｐゴシック"/>
@@ -6662,7 +6682,7 @@
   <a:extraClrSchemeLst/>
   <a:extLst>
     <a:ext uri="{05A4C25C-085E-4340-85A3-A5531E510DB2}">
-      <thm15:themeFamily xmlns:thm15="http://schemas.microsoft.com/office/thememl/2012/main" name="Damask" id="{F9A299A0-33D0-4E0F-9F3F-7163E3744208}" vid="{746EEEEA-FB6A-406B-B510-531588D54811}"/>
+      <thm15:themeFamily xmlns:thm15="http://schemas.microsoft.com/office/thememl/2012/main" xmlns="" name="Damask" id="{F9A299A0-33D0-4E0F-9F3F-7163E3744208}" vid="{746EEEEA-FB6A-406B-B510-531588D54811}"/>
     </a:ext>
   </a:extLst>
 </a:theme>

</xml_diff>